<commit_message>
New job directory structure figure
</commit_message>
<xml_diff>
--- a/images/figures.pptx
+++ b/images/figures.pptx
@@ -5,9 +5,9 @@
     <p:sldMasterId id="2147483648" r:id="rId1"/>
   </p:sldMasterIdLst>
   <p:sldIdLst>
-    <p:sldId id="256" r:id="rId2"/>
-    <p:sldId id="257" r:id="rId3"/>
-    <p:sldId id="258" r:id="rId4"/>
+    <p:sldId id="257" r:id="rId2"/>
+    <p:sldId id="258" r:id="rId3"/>
+    <p:sldId id="259" r:id="rId4"/>
   </p:sldIdLst>
   <p:sldSz cx="9144000" cy="6858000" type="screen4x3"/>
   <p:notesSz cx="6858000" cy="9144000"/>
@@ -290,7 +290,7 @@
           <a:p>
             <a:fld id="{7BB5318B-5AA0-5B4C-AE33-2B1172442896}" type="datetimeFigureOut">
               <a:rPr lang="en-US" smtClean="0"/>
-              <a:t>8/22/12</a:t>
+              <a:t>8/30/12</a:t>
             </a:fld>
             <a:endParaRPr lang="en-US"/>
           </a:p>
@@ -460,7 +460,7 @@
           <a:p>
             <a:fld id="{7BB5318B-5AA0-5B4C-AE33-2B1172442896}" type="datetimeFigureOut">
               <a:rPr lang="en-US" smtClean="0"/>
-              <a:t>8/22/12</a:t>
+              <a:t>8/30/12</a:t>
             </a:fld>
             <a:endParaRPr lang="en-US"/>
           </a:p>
@@ -640,7 +640,7 @@
           <a:p>
             <a:fld id="{7BB5318B-5AA0-5B4C-AE33-2B1172442896}" type="datetimeFigureOut">
               <a:rPr lang="en-US" smtClean="0"/>
-              <a:t>8/22/12</a:t>
+              <a:t>8/30/12</a:t>
             </a:fld>
             <a:endParaRPr lang="en-US"/>
           </a:p>
@@ -810,7 +810,7 @@
           <a:p>
             <a:fld id="{7BB5318B-5AA0-5B4C-AE33-2B1172442896}" type="datetimeFigureOut">
               <a:rPr lang="en-US" smtClean="0"/>
-              <a:t>8/22/12</a:t>
+              <a:t>8/30/12</a:t>
             </a:fld>
             <a:endParaRPr lang="en-US"/>
           </a:p>
@@ -1056,7 +1056,7 @@
           <a:p>
             <a:fld id="{7BB5318B-5AA0-5B4C-AE33-2B1172442896}" type="datetimeFigureOut">
               <a:rPr lang="en-US" smtClean="0"/>
-              <a:t>8/22/12</a:t>
+              <a:t>8/30/12</a:t>
             </a:fld>
             <a:endParaRPr lang="en-US"/>
           </a:p>
@@ -1344,7 +1344,7 @@
           <a:p>
             <a:fld id="{7BB5318B-5AA0-5B4C-AE33-2B1172442896}" type="datetimeFigureOut">
               <a:rPr lang="en-US" smtClean="0"/>
-              <a:t>8/22/12</a:t>
+              <a:t>8/30/12</a:t>
             </a:fld>
             <a:endParaRPr lang="en-US"/>
           </a:p>
@@ -1766,7 +1766,7 @@
           <a:p>
             <a:fld id="{7BB5318B-5AA0-5B4C-AE33-2B1172442896}" type="datetimeFigureOut">
               <a:rPr lang="en-US" smtClean="0"/>
-              <a:t>8/22/12</a:t>
+              <a:t>8/30/12</a:t>
             </a:fld>
             <a:endParaRPr lang="en-US"/>
           </a:p>
@@ -1884,7 +1884,7 @@
           <a:p>
             <a:fld id="{7BB5318B-5AA0-5B4C-AE33-2B1172442896}" type="datetimeFigureOut">
               <a:rPr lang="en-US" smtClean="0"/>
-              <a:t>8/22/12</a:t>
+              <a:t>8/30/12</a:t>
             </a:fld>
             <a:endParaRPr lang="en-US"/>
           </a:p>
@@ -1979,7 +1979,7 @@
           <a:p>
             <a:fld id="{7BB5318B-5AA0-5B4C-AE33-2B1172442896}" type="datetimeFigureOut">
               <a:rPr lang="en-US" smtClean="0"/>
-              <a:t>8/22/12</a:t>
+              <a:t>8/30/12</a:t>
             </a:fld>
             <a:endParaRPr lang="en-US"/>
           </a:p>
@@ -2256,7 +2256,7 @@
           <a:p>
             <a:fld id="{7BB5318B-5AA0-5B4C-AE33-2B1172442896}" type="datetimeFigureOut">
               <a:rPr lang="en-US" smtClean="0"/>
-              <a:t>8/22/12</a:t>
+              <a:t>8/30/12</a:t>
             </a:fld>
             <a:endParaRPr lang="en-US"/>
           </a:p>
@@ -2509,7 +2509,7 @@
           <a:p>
             <a:fld id="{7BB5318B-5AA0-5B4C-AE33-2B1172442896}" type="datetimeFigureOut">
               <a:rPr lang="en-US" smtClean="0"/>
-              <a:t>8/22/12</a:t>
+              <a:t>8/30/12</a:t>
             </a:fld>
             <a:endParaRPr lang="en-US"/>
           </a:p>
@@ -2722,7 +2722,7 @@
           <a:p>
             <a:fld id="{7BB5318B-5AA0-5B4C-AE33-2B1172442896}" type="datetimeFigureOut">
               <a:rPr lang="en-US" smtClean="0"/>
-              <a:t>8/22/12</a:t>
+              <a:t>8/30/12</a:t>
             </a:fld>
             <a:endParaRPr lang="en-US"/>
           </a:p>
@@ -3097,48 +3097,792 @@
           <a:chExt cx="0" cy="0"/>
         </a:xfrm>
       </p:grpSpPr>
-      <p:sp>
-        <p:nvSpPr>
-          <p:cNvPr id="2" name="Title 1"/>
-          <p:cNvSpPr>
-            <a:spLocks noGrp="1"/>
-          </p:cNvSpPr>
-          <p:nvPr>
-            <p:ph type="ctrTitle"/>
-          </p:nvPr>
-        </p:nvSpPr>
-        <p:spPr/>
-        <p:txBody>
-          <a:bodyPr/>
-          <a:lstStyle/>
-          <a:p>
-            <a:endParaRPr lang="en-US"/>
-          </a:p>
-        </p:txBody>
-      </p:sp>
-      <p:sp>
-        <p:nvSpPr>
-          <p:cNvPr id="3" name="Subtitle 2"/>
-          <p:cNvSpPr>
-            <a:spLocks noGrp="1"/>
-          </p:cNvSpPr>
-          <p:nvPr>
-            <p:ph type="subTitle" idx="1"/>
-          </p:nvPr>
-        </p:nvSpPr>
-        <p:spPr/>
-        <p:txBody>
-          <a:bodyPr/>
-          <a:lstStyle/>
-          <a:p>
-            <a:endParaRPr lang="en-US"/>
-          </a:p>
-        </p:txBody>
-      </p:sp>
+      <p:cxnSp>
+        <p:nvCxnSpPr>
+          <p:cNvPr id="45" name="Straight Arrow Connector 44"/>
+          <p:cNvCxnSpPr>
+            <a:endCxn id="9" idx="2"/>
+          </p:cNvCxnSpPr>
+          <p:nvPr/>
+        </p:nvCxnSpPr>
+        <p:spPr>
+          <a:xfrm>
+            <a:off x="4337821" y="3321442"/>
+            <a:ext cx="1805591" cy="918877"/>
+          </a:xfrm>
+          <a:prstGeom prst="straightConnector1">
+            <a:avLst/>
+          </a:prstGeom>
+          <a:ln>
+            <a:solidFill>
+              <a:schemeClr val="tx1"/>
+            </a:solidFill>
+            <a:tailEnd type="arrow"/>
+          </a:ln>
+        </p:spPr>
+        <p:style>
+          <a:lnRef idx="2">
+            <a:schemeClr val="accent1"/>
+          </a:lnRef>
+          <a:fillRef idx="0">
+            <a:schemeClr val="accent1"/>
+          </a:fillRef>
+          <a:effectRef idx="1">
+            <a:schemeClr val="accent1"/>
+          </a:effectRef>
+          <a:fontRef idx="minor">
+            <a:schemeClr val="tx1"/>
+          </a:fontRef>
+        </p:style>
+      </p:cxnSp>
+      <p:cxnSp>
+        <p:nvCxnSpPr>
+          <p:cNvPr id="43" name="Straight Arrow Connector 42"/>
+          <p:cNvCxnSpPr/>
+          <p:nvPr/>
+        </p:nvCxnSpPr>
+        <p:spPr>
+          <a:xfrm flipH="1">
+            <a:off x="2410634" y="3361458"/>
+            <a:ext cx="1831132" cy="888711"/>
+          </a:xfrm>
+          <a:prstGeom prst="straightConnector1">
+            <a:avLst/>
+          </a:prstGeom>
+          <a:ln>
+            <a:solidFill>
+              <a:schemeClr val="tx1"/>
+            </a:solidFill>
+            <a:headEnd type="arrow"/>
+            <a:tailEnd type="none"/>
+          </a:ln>
+        </p:spPr>
+        <p:style>
+          <a:lnRef idx="2">
+            <a:schemeClr val="accent1"/>
+          </a:lnRef>
+          <a:fillRef idx="0">
+            <a:schemeClr val="accent1"/>
+          </a:fillRef>
+          <a:effectRef idx="1">
+            <a:schemeClr val="accent1"/>
+          </a:effectRef>
+          <a:fontRef idx="minor">
+            <a:schemeClr val="tx1"/>
+          </a:fontRef>
+        </p:style>
+      </p:cxnSp>
+      <p:cxnSp>
+        <p:nvCxnSpPr>
+          <p:cNvPr id="18" name="Straight Arrow Connector 17"/>
+          <p:cNvCxnSpPr>
+            <a:endCxn id="10" idx="5"/>
+          </p:cNvCxnSpPr>
+          <p:nvPr/>
+        </p:nvCxnSpPr>
+        <p:spPr>
+          <a:xfrm flipH="1" flipV="1">
+            <a:off x="2508207" y="4342574"/>
+            <a:ext cx="1829615" cy="1023472"/>
+          </a:xfrm>
+          <a:prstGeom prst="straightConnector1">
+            <a:avLst/>
+          </a:prstGeom>
+          <a:ln>
+            <a:solidFill>
+              <a:schemeClr val="tx1"/>
+            </a:solidFill>
+            <a:tailEnd type="arrow"/>
+          </a:ln>
+        </p:spPr>
+        <p:style>
+          <a:lnRef idx="2">
+            <a:schemeClr val="accent1"/>
+          </a:lnRef>
+          <a:fillRef idx="0">
+            <a:schemeClr val="accent1"/>
+          </a:fillRef>
+          <a:effectRef idx="1">
+            <a:schemeClr val="accent1"/>
+          </a:effectRef>
+          <a:fontRef idx="minor">
+            <a:schemeClr val="tx1"/>
+          </a:fontRef>
+        </p:style>
+      </p:cxnSp>
+      <p:cxnSp>
+        <p:nvCxnSpPr>
+          <p:cNvPr id="13" name="Straight Arrow Connector 12"/>
+          <p:cNvCxnSpPr>
+            <a:stCxn id="9" idx="3"/>
+          </p:cNvCxnSpPr>
+          <p:nvPr/>
+        </p:nvCxnSpPr>
+        <p:spPr>
+          <a:xfrm flipH="1">
+            <a:off x="4337822" y="4342574"/>
+            <a:ext cx="1849782" cy="1023472"/>
+          </a:xfrm>
+          <a:prstGeom prst="straightConnector1">
+            <a:avLst/>
+          </a:prstGeom>
+          <a:ln>
+            <a:solidFill>
+              <a:schemeClr val="tx1"/>
+            </a:solidFill>
+            <a:headEnd type="arrow"/>
+            <a:tailEnd type="none"/>
+          </a:ln>
+        </p:spPr>
+        <p:style>
+          <a:lnRef idx="2">
+            <a:schemeClr val="accent1"/>
+          </a:lnRef>
+          <a:fillRef idx="0">
+            <a:schemeClr val="accent1"/>
+          </a:fillRef>
+          <a:effectRef idx="1">
+            <a:schemeClr val="accent1"/>
+          </a:effectRef>
+          <a:fontRef idx="minor">
+            <a:schemeClr val="tx1"/>
+          </a:fontRef>
+        </p:style>
+      </p:cxnSp>
+      <p:cxnSp>
+        <p:nvCxnSpPr>
+          <p:cNvPr id="20" name="Straight Arrow Connector 19"/>
+          <p:cNvCxnSpPr>
+            <a:stCxn id="8" idx="1"/>
+            <a:endCxn id="7" idx="6"/>
+          </p:cNvCxnSpPr>
+          <p:nvPr/>
+        </p:nvCxnSpPr>
+        <p:spPr>
+          <a:xfrm flipH="1" flipV="1">
+            <a:off x="4493260" y="1356176"/>
+            <a:ext cx="1694344" cy="735753"/>
+          </a:xfrm>
+          <a:prstGeom prst="straightConnector1">
+            <a:avLst/>
+          </a:prstGeom>
+          <a:ln>
+            <a:solidFill>
+              <a:schemeClr val="tx1"/>
+            </a:solidFill>
+            <a:headEnd type="arrow"/>
+            <a:tailEnd type="none"/>
+          </a:ln>
+        </p:spPr>
+        <p:style>
+          <a:lnRef idx="2">
+            <a:schemeClr val="accent1"/>
+          </a:lnRef>
+          <a:fillRef idx="0">
+            <a:schemeClr val="accent1"/>
+          </a:fillRef>
+          <a:effectRef idx="1">
+            <a:schemeClr val="accent1"/>
+          </a:effectRef>
+          <a:fontRef idx="minor">
+            <a:schemeClr val="tx1"/>
+          </a:fontRef>
+        </p:style>
+      </p:cxnSp>
+      <p:cxnSp>
+        <p:nvCxnSpPr>
+          <p:cNvPr id="15" name="Straight Arrow Connector 14"/>
+          <p:cNvCxnSpPr>
+            <a:endCxn id="9" idx="0"/>
+          </p:cNvCxnSpPr>
+          <p:nvPr/>
+        </p:nvCxnSpPr>
+        <p:spPr>
+          <a:xfrm>
+            <a:off x="6275643" y="2194184"/>
+            <a:ext cx="18650" cy="1901524"/>
+          </a:xfrm>
+          <a:prstGeom prst="straightConnector1">
+            <a:avLst/>
+          </a:prstGeom>
+          <a:ln>
+            <a:solidFill>
+              <a:schemeClr val="tx1"/>
+            </a:solidFill>
+            <a:tailEnd type="arrow"/>
+          </a:ln>
+        </p:spPr>
+        <p:style>
+          <a:lnRef idx="2">
+            <a:schemeClr val="accent1"/>
+          </a:lnRef>
+          <a:fillRef idx="0">
+            <a:schemeClr val="accent1"/>
+          </a:fillRef>
+          <a:effectRef idx="1">
+            <a:schemeClr val="accent1"/>
+          </a:effectRef>
+          <a:fontRef idx="minor">
+            <a:schemeClr val="tx1"/>
+          </a:fontRef>
+        </p:style>
+      </p:cxnSp>
+      <p:cxnSp>
+        <p:nvCxnSpPr>
+          <p:cNvPr id="17" name="Straight Arrow Connector 16"/>
+          <p:cNvCxnSpPr/>
+          <p:nvPr/>
+        </p:nvCxnSpPr>
+        <p:spPr>
+          <a:xfrm>
+            <a:off x="2391984" y="2232048"/>
+            <a:ext cx="18650" cy="1901524"/>
+          </a:xfrm>
+          <a:prstGeom prst="straightConnector1">
+            <a:avLst/>
+          </a:prstGeom>
+          <a:ln>
+            <a:solidFill>
+              <a:schemeClr val="tx1"/>
+            </a:solidFill>
+            <a:tailEnd type="arrow"/>
+          </a:ln>
+        </p:spPr>
+        <p:style>
+          <a:lnRef idx="2">
+            <a:schemeClr val="accent1"/>
+          </a:lnRef>
+          <a:fillRef idx="0">
+            <a:schemeClr val="accent1"/>
+          </a:fillRef>
+          <a:effectRef idx="1">
+            <a:schemeClr val="accent1"/>
+          </a:effectRef>
+          <a:fontRef idx="minor">
+            <a:schemeClr val="tx1"/>
+          </a:fontRef>
+        </p:style>
+      </p:cxnSp>
+      <p:cxnSp>
+        <p:nvCxnSpPr>
+          <p:cNvPr id="12" name="Straight Arrow Connector 11"/>
+          <p:cNvCxnSpPr>
+            <a:endCxn id="4" idx="6"/>
+          </p:cNvCxnSpPr>
+          <p:nvPr/>
+        </p:nvCxnSpPr>
+        <p:spPr>
+          <a:xfrm flipH="1">
+            <a:off x="2552399" y="1370532"/>
+            <a:ext cx="1785422" cy="823652"/>
+          </a:xfrm>
+          <a:prstGeom prst="straightConnector1">
+            <a:avLst/>
+          </a:prstGeom>
+          <a:ln>
+            <a:solidFill>
+              <a:schemeClr val="tx1"/>
+            </a:solidFill>
+            <a:tailEnd type="arrow"/>
+          </a:ln>
+        </p:spPr>
+        <p:style>
+          <a:lnRef idx="2">
+            <a:schemeClr val="accent1"/>
+          </a:lnRef>
+          <a:fillRef idx="0">
+            <a:schemeClr val="accent1"/>
+          </a:fillRef>
+          <a:effectRef idx="1">
+            <a:schemeClr val="accent1"/>
+          </a:effectRef>
+          <a:fontRef idx="minor">
+            <a:schemeClr val="tx1"/>
+          </a:fontRef>
+        </p:style>
+      </p:cxnSp>
+      <p:sp>
+        <p:nvSpPr>
+          <p:cNvPr id="4" name="Oval 3"/>
+          <p:cNvSpPr/>
+          <p:nvPr/>
+        </p:nvSpPr>
+        <p:spPr>
+          <a:xfrm>
+            <a:off x="2250637" y="2049573"/>
+            <a:ext cx="301762" cy="289222"/>
+          </a:xfrm>
+          <a:prstGeom prst="ellipse">
+            <a:avLst/>
+          </a:prstGeom>
+          <a:solidFill>
+            <a:srgbClr val="000000"/>
+          </a:solidFill>
+          <a:ln>
+            <a:solidFill>
+              <a:schemeClr val="tx1"/>
+            </a:solidFill>
+          </a:ln>
+        </p:spPr>
+        <p:style>
+          <a:lnRef idx="1">
+            <a:schemeClr val="accent1"/>
+          </a:lnRef>
+          <a:fillRef idx="3">
+            <a:schemeClr val="accent1"/>
+          </a:fillRef>
+          <a:effectRef idx="2">
+            <a:schemeClr val="accent1"/>
+          </a:effectRef>
+          <a:fontRef idx="minor">
+            <a:schemeClr val="lt1"/>
+          </a:fontRef>
+        </p:style>
+        <p:txBody>
+          <a:bodyPr rtlCol="0" anchor="ctr"/>
+          <a:lstStyle/>
+          <a:p>
+            <a:pPr algn="ctr"/>
+            <a:endParaRPr lang="en-US"/>
+          </a:p>
+        </p:txBody>
+      </p:sp>
+      <p:sp>
+        <p:nvSpPr>
+          <p:cNvPr id="5" name="Oval 4"/>
+          <p:cNvSpPr/>
+          <p:nvPr/>
+        </p:nvSpPr>
+        <p:spPr>
+          <a:xfrm>
+            <a:off x="4191498" y="3182810"/>
+            <a:ext cx="301762" cy="289222"/>
+          </a:xfrm>
+          <a:prstGeom prst="ellipse">
+            <a:avLst/>
+          </a:prstGeom>
+          <a:solidFill>
+            <a:srgbClr val="000000"/>
+          </a:solidFill>
+          <a:ln>
+            <a:solidFill>
+              <a:schemeClr val="tx1"/>
+            </a:solidFill>
+          </a:ln>
+        </p:spPr>
+        <p:style>
+          <a:lnRef idx="1">
+            <a:schemeClr val="accent1"/>
+          </a:lnRef>
+          <a:fillRef idx="3">
+            <a:schemeClr val="accent1"/>
+          </a:fillRef>
+          <a:effectRef idx="2">
+            <a:schemeClr val="accent1"/>
+          </a:effectRef>
+          <a:fontRef idx="minor">
+            <a:schemeClr val="lt1"/>
+          </a:fontRef>
+        </p:style>
+        <p:txBody>
+          <a:bodyPr rtlCol="0" anchor="ctr"/>
+          <a:lstStyle/>
+          <a:p>
+            <a:pPr algn="ctr"/>
+            <a:endParaRPr lang="en-US"/>
+          </a:p>
+        </p:txBody>
+      </p:sp>
+      <p:sp>
+        <p:nvSpPr>
+          <p:cNvPr id="6" name="Oval 5"/>
+          <p:cNvSpPr/>
+          <p:nvPr/>
+        </p:nvSpPr>
+        <p:spPr>
+          <a:xfrm>
+            <a:off x="4191498" y="5221435"/>
+            <a:ext cx="301762" cy="289222"/>
+          </a:xfrm>
+          <a:prstGeom prst="ellipse">
+            <a:avLst/>
+          </a:prstGeom>
+          <a:solidFill>
+            <a:srgbClr val="000000"/>
+          </a:solidFill>
+          <a:ln>
+            <a:solidFill>
+              <a:schemeClr val="tx1"/>
+            </a:solidFill>
+          </a:ln>
+        </p:spPr>
+        <p:style>
+          <a:lnRef idx="1">
+            <a:schemeClr val="accent1"/>
+          </a:lnRef>
+          <a:fillRef idx="3">
+            <a:schemeClr val="accent1"/>
+          </a:fillRef>
+          <a:effectRef idx="2">
+            <a:schemeClr val="accent1"/>
+          </a:effectRef>
+          <a:fontRef idx="minor">
+            <a:schemeClr val="lt1"/>
+          </a:fontRef>
+        </p:style>
+        <p:txBody>
+          <a:bodyPr rtlCol="0" anchor="ctr"/>
+          <a:lstStyle/>
+          <a:p>
+            <a:pPr algn="ctr"/>
+            <a:endParaRPr lang="en-US"/>
+          </a:p>
+        </p:txBody>
+      </p:sp>
+      <p:sp>
+        <p:nvSpPr>
+          <p:cNvPr id="7" name="Oval 6"/>
+          <p:cNvSpPr/>
+          <p:nvPr/>
+        </p:nvSpPr>
+        <p:spPr>
+          <a:xfrm>
+            <a:off x="4191498" y="1211565"/>
+            <a:ext cx="301762" cy="289222"/>
+          </a:xfrm>
+          <a:prstGeom prst="ellipse">
+            <a:avLst/>
+          </a:prstGeom>
+          <a:solidFill>
+            <a:srgbClr val="000000"/>
+          </a:solidFill>
+          <a:ln>
+            <a:solidFill>
+              <a:schemeClr val="tx1"/>
+            </a:solidFill>
+          </a:ln>
+        </p:spPr>
+        <p:style>
+          <a:lnRef idx="1">
+            <a:schemeClr val="accent1"/>
+          </a:lnRef>
+          <a:fillRef idx="3">
+            <a:schemeClr val="accent1"/>
+          </a:fillRef>
+          <a:effectRef idx="2">
+            <a:schemeClr val="accent1"/>
+          </a:effectRef>
+          <a:fontRef idx="minor">
+            <a:schemeClr val="lt1"/>
+          </a:fontRef>
+        </p:style>
+        <p:txBody>
+          <a:bodyPr rtlCol="0" anchor="ctr"/>
+          <a:lstStyle/>
+          <a:p>
+            <a:pPr algn="ctr"/>
+            <a:endParaRPr lang="en-US"/>
+          </a:p>
+        </p:txBody>
+      </p:sp>
+      <p:sp>
+        <p:nvSpPr>
+          <p:cNvPr id="8" name="Oval 7"/>
+          <p:cNvSpPr/>
+          <p:nvPr/>
+        </p:nvSpPr>
+        <p:spPr>
+          <a:xfrm>
+            <a:off x="6143412" y="2049573"/>
+            <a:ext cx="301762" cy="289222"/>
+          </a:xfrm>
+          <a:prstGeom prst="ellipse">
+            <a:avLst/>
+          </a:prstGeom>
+          <a:solidFill>
+            <a:srgbClr val="000000"/>
+          </a:solidFill>
+          <a:ln>
+            <a:solidFill>
+              <a:schemeClr val="tx1"/>
+            </a:solidFill>
+          </a:ln>
+        </p:spPr>
+        <p:style>
+          <a:lnRef idx="1">
+            <a:schemeClr val="accent1"/>
+          </a:lnRef>
+          <a:fillRef idx="3">
+            <a:schemeClr val="accent1"/>
+          </a:fillRef>
+          <a:effectRef idx="2">
+            <a:schemeClr val="accent1"/>
+          </a:effectRef>
+          <a:fontRef idx="minor">
+            <a:schemeClr val="lt1"/>
+          </a:fontRef>
+        </p:style>
+        <p:txBody>
+          <a:bodyPr rtlCol="0" anchor="ctr"/>
+          <a:lstStyle/>
+          <a:p>
+            <a:pPr algn="ctr"/>
+            <a:endParaRPr lang="en-US"/>
+          </a:p>
+        </p:txBody>
+      </p:sp>
+      <p:sp>
+        <p:nvSpPr>
+          <p:cNvPr id="9" name="Oval 8"/>
+          <p:cNvSpPr/>
+          <p:nvPr/>
+        </p:nvSpPr>
+        <p:spPr>
+          <a:xfrm>
+            <a:off x="6143412" y="4095708"/>
+            <a:ext cx="301762" cy="289222"/>
+          </a:xfrm>
+          <a:prstGeom prst="ellipse">
+            <a:avLst/>
+          </a:prstGeom>
+          <a:solidFill>
+            <a:srgbClr val="000000"/>
+          </a:solidFill>
+          <a:ln>
+            <a:solidFill>
+              <a:schemeClr val="tx1"/>
+            </a:solidFill>
+          </a:ln>
+        </p:spPr>
+        <p:style>
+          <a:lnRef idx="1">
+            <a:schemeClr val="accent1"/>
+          </a:lnRef>
+          <a:fillRef idx="3">
+            <a:schemeClr val="accent1"/>
+          </a:fillRef>
+          <a:effectRef idx="2">
+            <a:schemeClr val="accent1"/>
+          </a:effectRef>
+          <a:fontRef idx="minor">
+            <a:schemeClr val="lt1"/>
+          </a:fontRef>
+        </p:style>
+        <p:txBody>
+          <a:bodyPr rtlCol="0" anchor="ctr"/>
+          <a:lstStyle/>
+          <a:p>
+            <a:pPr algn="ctr"/>
+            <a:endParaRPr lang="en-US"/>
+          </a:p>
+        </p:txBody>
+      </p:sp>
+      <p:sp>
+        <p:nvSpPr>
+          <p:cNvPr id="10" name="Oval 9"/>
+          <p:cNvSpPr/>
+          <p:nvPr/>
+        </p:nvSpPr>
+        <p:spPr>
+          <a:xfrm>
+            <a:off x="2250637" y="4095708"/>
+            <a:ext cx="301762" cy="289222"/>
+          </a:xfrm>
+          <a:prstGeom prst="ellipse">
+            <a:avLst/>
+          </a:prstGeom>
+          <a:solidFill>
+            <a:srgbClr val="000000"/>
+          </a:solidFill>
+          <a:ln>
+            <a:solidFill>
+              <a:schemeClr val="tx1"/>
+            </a:solidFill>
+          </a:ln>
+        </p:spPr>
+        <p:style>
+          <a:lnRef idx="1">
+            <a:schemeClr val="accent1"/>
+          </a:lnRef>
+          <a:fillRef idx="3">
+            <a:schemeClr val="accent1"/>
+          </a:fillRef>
+          <a:effectRef idx="2">
+            <a:schemeClr val="accent1"/>
+          </a:effectRef>
+          <a:fontRef idx="minor">
+            <a:schemeClr val="lt1"/>
+          </a:fontRef>
+        </p:style>
+        <p:txBody>
+          <a:bodyPr rtlCol="0" anchor="ctr"/>
+          <a:lstStyle/>
+          <a:p>
+            <a:pPr algn="ctr"/>
+            <a:endParaRPr lang="en-US"/>
+          </a:p>
+        </p:txBody>
+      </p:sp>
+      <p:cxnSp>
+        <p:nvCxnSpPr>
+          <p:cNvPr id="31" name="Straight Arrow Connector 30"/>
+          <p:cNvCxnSpPr>
+            <a:stCxn id="7" idx="4"/>
+            <a:endCxn id="5" idx="0"/>
+          </p:cNvCxnSpPr>
+          <p:nvPr/>
+        </p:nvCxnSpPr>
+        <p:spPr>
+          <a:xfrm>
+            <a:off x="4342379" y="1500787"/>
+            <a:ext cx="0" cy="1682023"/>
+          </a:xfrm>
+          <a:prstGeom prst="straightConnector1">
+            <a:avLst/>
+          </a:prstGeom>
+          <a:ln>
+            <a:solidFill>
+              <a:schemeClr val="tx1"/>
+            </a:solidFill>
+            <a:tailEnd type="arrow"/>
+          </a:ln>
+        </p:spPr>
+        <p:style>
+          <a:lnRef idx="2">
+            <a:schemeClr val="accent1"/>
+          </a:lnRef>
+          <a:fillRef idx="0">
+            <a:schemeClr val="accent1"/>
+          </a:fillRef>
+          <a:effectRef idx="1">
+            <a:schemeClr val="accent1"/>
+          </a:effectRef>
+          <a:fontRef idx="minor">
+            <a:schemeClr val="tx1"/>
+          </a:fontRef>
+        </p:style>
+      </p:cxnSp>
+      <p:cxnSp>
+        <p:nvCxnSpPr>
+          <p:cNvPr id="34" name="Straight Arrow Connector 33"/>
+          <p:cNvCxnSpPr>
+            <a:stCxn id="4" idx="5"/>
+            <a:endCxn id="5" idx="1"/>
+          </p:cNvCxnSpPr>
+          <p:nvPr/>
+        </p:nvCxnSpPr>
+        <p:spPr>
+          <a:xfrm>
+            <a:off x="2508207" y="2296439"/>
+            <a:ext cx="1727483" cy="928727"/>
+          </a:xfrm>
+          <a:prstGeom prst="straightConnector1">
+            <a:avLst/>
+          </a:prstGeom>
+          <a:ln>
+            <a:solidFill>
+              <a:schemeClr val="tx1"/>
+            </a:solidFill>
+            <a:tailEnd type="arrow"/>
+          </a:ln>
+        </p:spPr>
+        <p:style>
+          <a:lnRef idx="2">
+            <a:schemeClr val="accent1"/>
+          </a:lnRef>
+          <a:fillRef idx="0">
+            <a:schemeClr val="accent1"/>
+          </a:fillRef>
+          <a:effectRef idx="1">
+            <a:schemeClr val="accent1"/>
+          </a:effectRef>
+          <a:fontRef idx="minor">
+            <a:schemeClr val="tx1"/>
+          </a:fontRef>
+        </p:style>
+      </p:cxnSp>
+      <p:cxnSp>
+        <p:nvCxnSpPr>
+          <p:cNvPr id="37" name="Straight Arrow Connector 36"/>
+          <p:cNvCxnSpPr>
+            <a:stCxn id="5" idx="6"/>
+            <a:endCxn id="8" idx="3"/>
+          </p:cNvCxnSpPr>
+          <p:nvPr/>
+        </p:nvCxnSpPr>
+        <p:spPr>
+          <a:xfrm flipV="1">
+            <a:off x="4493260" y="2296439"/>
+            <a:ext cx="1694344" cy="1030982"/>
+          </a:xfrm>
+          <a:prstGeom prst="straightConnector1">
+            <a:avLst/>
+          </a:prstGeom>
+          <a:ln>
+            <a:solidFill>
+              <a:schemeClr val="tx1"/>
+            </a:solidFill>
+            <a:tailEnd type="arrow"/>
+          </a:ln>
+        </p:spPr>
+        <p:style>
+          <a:lnRef idx="2">
+            <a:schemeClr val="accent1"/>
+          </a:lnRef>
+          <a:fillRef idx="0">
+            <a:schemeClr val="accent1"/>
+          </a:fillRef>
+          <a:effectRef idx="1">
+            <a:schemeClr val="accent1"/>
+          </a:effectRef>
+          <a:fontRef idx="minor">
+            <a:schemeClr val="tx1"/>
+          </a:fontRef>
+        </p:style>
+      </p:cxnSp>
+      <p:cxnSp>
+        <p:nvCxnSpPr>
+          <p:cNvPr id="41" name="Straight Arrow Connector 40"/>
+          <p:cNvCxnSpPr>
+            <a:stCxn id="5" idx="4"/>
+          </p:cNvCxnSpPr>
+          <p:nvPr/>
+        </p:nvCxnSpPr>
+        <p:spPr>
+          <a:xfrm>
+            <a:off x="4342379" y="3472032"/>
+            <a:ext cx="0" cy="1749403"/>
+          </a:xfrm>
+          <a:prstGeom prst="straightConnector1">
+            <a:avLst/>
+          </a:prstGeom>
+          <a:ln>
+            <a:solidFill>
+              <a:schemeClr val="tx1"/>
+            </a:solidFill>
+            <a:headEnd type="arrow"/>
+            <a:tailEnd type="none"/>
+          </a:ln>
+        </p:spPr>
+        <p:style>
+          <a:lnRef idx="2">
+            <a:schemeClr val="accent1"/>
+          </a:lnRef>
+          <a:fillRef idx="0">
+            <a:schemeClr val="accent1"/>
+          </a:fillRef>
+          <a:effectRef idx="1">
+            <a:schemeClr val="accent1"/>
+          </a:effectRef>
+          <a:fontRef idx="minor">
+            <a:schemeClr val="tx1"/>
+          </a:fontRef>
+        </p:style>
+      </p:cxnSp>
     </p:spTree>
     <p:extLst>
       <p:ext uri="{BB962C8B-B14F-4D97-AF65-F5344CB8AC3E}">
-        <p14:creationId xmlns:p14="http://schemas.microsoft.com/office/powerpoint/2010/main" val="3146017842"/>
+        <p14:creationId xmlns:p14="http://schemas.microsoft.com/office/powerpoint/2010/main" val="1751997570"/>
       </p:ext>
     </p:extLst>
   </p:cSld>
@@ -3167,9 +3911,9 @@
       </p:grpSpPr>
       <p:cxnSp>
         <p:nvCxnSpPr>
-          <p:cNvPr id="45" name="Straight Arrow Connector 44"/>
+          <p:cNvPr id="4" name="Straight Arrow Connector 3"/>
           <p:cNvCxnSpPr>
-            <a:endCxn id="9" idx="2"/>
+            <a:endCxn id="17" idx="2"/>
           </p:cNvCxnSpPr>
           <p:nvPr/>
         </p:nvCxnSpPr>
@@ -3205,7 +3949,7 @@
       </p:cxnSp>
       <p:cxnSp>
         <p:nvCxnSpPr>
-          <p:cNvPr id="43" name="Straight Arrow Connector 42"/>
+          <p:cNvPr id="5" name="Straight Arrow Connector 4"/>
           <p:cNvCxnSpPr/>
           <p:nvPr/>
         </p:nvCxnSpPr>
@@ -3242,9 +3986,9 @@
       </p:cxnSp>
       <p:cxnSp>
         <p:nvCxnSpPr>
-          <p:cNvPr id="18" name="Straight Arrow Connector 17"/>
+          <p:cNvPr id="6" name="Straight Arrow Connector 5"/>
           <p:cNvCxnSpPr>
-            <a:endCxn id="10" idx="5"/>
+            <a:endCxn id="18" idx="5"/>
           </p:cNvCxnSpPr>
           <p:nvPr/>
         </p:nvCxnSpPr>
@@ -3280,9 +4024,9 @@
       </p:cxnSp>
       <p:cxnSp>
         <p:nvCxnSpPr>
-          <p:cNvPr id="13" name="Straight Arrow Connector 12"/>
+          <p:cNvPr id="7" name="Straight Arrow Connector 6"/>
           <p:cNvCxnSpPr>
-            <a:stCxn id="9" idx="3"/>
+            <a:stCxn id="17" idx="3"/>
           </p:cNvCxnSpPr>
           <p:nvPr/>
         </p:nvCxnSpPr>
@@ -3319,10 +4063,10 @@
       </p:cxnSp>
       <p:cxnSp>
         <p:nvCxnSpPr>
-          <p:cNvPr id="20" name="Straight Arrow Connector 19"/>
+          <p:cNvPr id="8" name="Straight Arrow Connector 7"/>
           <p:cNvCxnSpPr>
-            <a:stCxn id="8" idx="1"/>
-            <a:endCxn id="7" idx="6"/>
+            <a:stCxn id="16" idx="1"/>
+            <a:endCxn id="15" idx="6"/>
           </p:cNvCxnSpPr>
           <p:nvPr/>
         </p:nvCxnSpPr>
@@ -3359,9 +4103,9 @@
       </p:cxnSp>
       <p:cxnSp>
         <p:nvCxnSpPr>
-          <p:cNvPr id="15" name="Straight Arrow Connector 14"/>
+          <p:cNvPr id="9" name="Straight Arrow Connector 8"/>
           <p:cNvCxnSpPr>
-            <a:endCxn id="9" idx="0"/>
+            <a:endCxn id="17" idx="0"/>
           </p:cNvCxnSpPr>
           <p:nvPr/>
         </p:nvCxnSpPr>
@@ -3397,7 +4141,7 @@
       </p:cxnSp>
       <p:cxnSp>
         <p:nvCxnSpPr>
-          <p:cNvPr id="17" name="Straight Arrow Connector 16"/>
+          <p:cNvPr id="10" name="Straight Arrow Connector 9"/>
           <p:cNvCxnSpPr/>
           <p:nvPr/>
         </p:nvCxnSpPr>
@@ -3433,9 +4177,9 @@
       </p:cxnSp>
       <p:cxnSp>
         <p:nvCxnSpPr>
-          <p:cNvPr id="12" name="Straight Arrow Connector 11"/>
+          <p:cNvPr id="11" name="Straight Arrow Connector 10"/>
           <p:cNvCxnSpPr>
-            <a:endCxn id="4" idx="6"/>
+            <a:endCxn id="12" idx="6"/>
           </p:cNvCxnSpPr>
           <p:nvPr/>
         </p:nvCxnSpPr>
@@ -3471,7 +4215,7 @@
       </p:cxnSp>
       <p:sp>
         <p:nvSpPr>
-          <p:cNvPr id="4" name="Oval 3"/>
+          <p:cNvPr id="12" name="Oval 11"/>
           <p:cNvSpPr/>
           <p:nvPr/>
         </p:nvSpPr>
@@ -3484,7 +4228,7 @@
             <a:avLst/>
           </a:prstGeom>
           <a:solidFill>
-            <a:srgbClr val="000000"/>
+            <a:srgbClr val="4F81BD"/>
           </a:solidFill>
           <a:ln>
             <a:solidFill>
@@ -3517,7 +4261,7 @@
       </p:sp>
       <p:sp>
         <p:nvSpPr>
-          <p:cNvPr id="5" name="Oval 4"/>
+          <p:cNvPr id="13" name="Oval 12"/>
           <p:cNvSpPr/>
           <p:nvPr/>
         </p:nvSpPr>
@@ -3530,7 +4274,7 @@
             <a:avLst/>
           </a:prstGeom>
           <a:solidFill>
-            <a:srgbClr val="000000"/>
+            <a:srgbClr val="4F81BD"/>
           </a:solidFill>
           <a:ln>
             <a:solidFill>
@@ -3563,7 +4307,7 @@
       </p:sp>
       <p:sp>
         <p:nvSpPr>
-          <p:cNvPr id="6" name="Oval 5"/>
+          <p:cNvPr id="14" name="Oval 13"/>
           <p:cNvSpPr/>
           <p:nvPr/>
         </p:nvSpPr>
@@ -3576,7 +4320,7 @@
             <a:avLst/>
           </a:prstGeom>
           <a:solidFill>
-            <a:srgbClr val="000000"/>
+            <a:srgbClr val="C0504D"/>
           </a:solidFill>
           <a:ln>
             <a:solidFill>
@@ -3609,7 +4353,7 @@
       </p:sp>
       <p:sp>
         <p:nvSpPr>
-          <p:cNvPr id="7" name="Oval 6"/>
+          <p:cNvPr id="15" name="Oval 14"/>
           <p:cNvSpPr/>
           <p:nvPr/>
         </p:nvSpPr>
@@ -3622,7 +4366,7 @@
             <a:avLst/>
           </a:prstGeom>
           <a:solidFill>
-            <a:srgbClr val="000000"/>
+            <a:schemeClr val="accent2"/>
           </a:solidFill>
           <a:ln>
             <a:solidFill>
@@ -3655,7 +4399,7 @@
       </p:sp>
       <p:sp>
         <p:nvSpPr>
-          <p:cNvPr id="8" name="Oval 7"/>
+          <p:cNvPr id="16" name="Oval 15"/>
           <p:cNvSpPr/>
           <p:nvPr/>
         </p:nvSpPr>
@@ -3668,7 +4412,7 @@
             <a:avLst/>
           </a:prstGeom>
           <a:solidFill>
-            <a:srgbClr val="000000"/>
+            <a:schemeClr val="accent1"/>
           </a:solidFill>
           <a:ln>
             <a:solidFill>
@@ -3701,7 +4445,7 @@
       </p:sp>
       <p:sp>
         <p:nvSpPr>
-          <p:cNvPr id="9" name="Oval 8"/>
+          <p:cNvPr id="17" name="Oval 16"/>
           <p:cNvSpPr/>
           <p:nvPr/>
         </p:nvSpPr>
@@ -3714,7 +4458,7 @@
             <a:avLst/>
           </a:prstGeom>
           <a:solidFill>
-            <a:srgbClr val="000000"/>
+            <a:srgbClr val="4F81BD"/>
           </a:solidFill>
           <a:ln>
             <a:solidFill>
@@ -3747,7 +4491,7 @@
       </p:sp>
       <p:sp>
         <p:nvSpPr>
-          <p:cNvPr id="10" name="Oval 9"/>
+          <p:cNvPr id="18" name="Oval 17"/>
           <p:cNvSpPr/>
           <p:nvPr/>
         </p:nvSpPr>
@@ -3760,7 +4504,7 @@
             <a:avLst/>
           </a:prstGeom>
           <a:solidFill>
-            <a:srgbClr val="000000"/>
+            <a:srgbClr val="4F81BD"/>
           </a:solidFill>
           <a:ln>
             <a:solidFill>
@@ -3793,10 +4537,10 @@
       </p:sp>
       <p:cxnSp>
         <p:nvCxnSpPr>
-          <p:cNvPr id="31" name="Straight Arrow Connector 30"/>
+          <p:cNvPr id="19" name="Straight Arrow Connector 18"/>
           <p:cNvCxnSpPr>
-            <a:stCxn id="7" idx="4"/>
-            <a:endCxn id="5" idx="0"/>
+            <a:stCxn id="15" idx="4"/>
+            <a:endCxn id="13" idx="0"/>
           </p:cNvCxnSpPr>
           <p:nvPr/>
         </p:nvCxnSpPr>
@@ -3832,10 +4576,10 @@
       </p:cxnSp>
       <p:cxnSp>
         <p:nvCxnSpPr>
-          <p:cNvPr id="34" name="Straight Arrow Connector 33"/>
+          <p:cNvPr id="20" name="Straight Arrow Connector 19"/>
           <p:cNvCxnSpPr>
-            <a:stCxn id="4" idx="5"/>
-            <a:endCxn id="5" idx="1"/>
+            <a:stCxn id="12" idx="5"/>
+            <a:endCxn id="13" idx="1"/>
           </p:cNvCxnSpPr>
           <p:nvPr/>
         </p:nvCxnSpPr>
@@ -3871,10 +4615,10 @@
       </p:cxnSp>
       <p:cxnSp>
         <p:nvCxnSpPr>
-          <p:cNvPr id="37" name="Straight Arrow Connector 36"/>
+          <p:cNvPr id="21" name="Straight Arrow Connector 20"/>
           <p:cNvCxnSpPr>
-            <a:stCxn id="5" idx="6"/>
-            <a:endCxn id="8" idx="3"/>
+            <a:stCxn id="13" idx="6"/>
+            <a:endCxn id="16" idx="3"/>
           </p:cNvCxnSpPr>
           <p:nvPr/>
         </p:nvCxnSpPr>
@@ -3910,9 +4654,9 @@
       </p:cxnSp>
       <p:cxnSp>
         <p:nvCxnSpPr>
-          <p:cNvPr id="41" name="Straight Arrow Connector 40"/>
+          <p:cNvPr id="22" name="Straight Arrow Connector 21"/>
           <p:cNvCxnSpPr>
-            <a:stCxn id="5" idx="4"/>
+            <a:stCxn id="13" idx="4"/>
           </p:cNvCxnSpPr>
           <p:nvPr/>
         </p:nvCxnSpPr>
@@ -3950,7 +4694,7 @@
     </p:spTree>
     <p:extLst>
       <p:ext uri="{BB962C8B-B14F-4D97-AF65-F5344CB8AC3E}">
-        <p14:creationId xmlns:p14="http://schemas.microsoft.com/office/powerpoint/2010/main" val="1751997570"/>
+        <p14:creationId xmlns:p14="http://schemas.microsoft.com/office/powerpoint/2010/main" val="1613062859"/>
       </p:ext>
     </p:extLst>
   </p:cSld>
@@ -3979,26 +4723,18 @@
       </p:grpSpPr>
       <p:cxnSp>
         <p:nvCxnSpPr>
-          <p:cNvPr id="4" name="Straight Arrow Connector 3"/>
-          <p:cNvCxnSpPr>
-            <a:endCxn id="17" idx="2"/>
-          </p:cNvCxnSpPr>
+          <p:cNvPr id="34" name="Straight Connector 33"/>
+          <p:cNvCxnSpPr/>
           <p:nvPr/>
         </p:nvCxnSpPr>
         <p:spPr>
           <a:xfrm>
-            <a:off x="4337821" y="3321442"/>
-            <a:ext cx="1805591" cy="918877"/>
-          </a:xfrm>
-          <a:prstGeom prst="straightConnector1">
-            <a:avLst/>
-          </a:prstGeom>
-          <a:ln>
-            <a:solidFill>
-              <a:schemeClr val="tx1"/>
-            </a:solidFill>
-            <a:tailEnd type="arrow"/>
-          </a:ln>
+            <a:off x="1066800" y="4483100"/>
+            <a:ext cx="0" cy="977900"/>
+          </a:xfrm>
+          <a:prstGeom prst="line">
+            <a:avLst/>
+          </a:prstGeom>
         </p:spPr>
         <p:style>
           <a:lnRef idx="2">
@@ -4017,25 +4753,18 @@
       </p:cxnSp>
       <p:cxnSp>
         <p:nvCxnSpPr>
-          <p:cNvPr id="5" name="Straight Arrow Connector 4"/>
+          <p:cNvPr id="36" name="Straight Connector 35"/>
           <p:cNvCxnSpPr/>
           <p:nvPr/>
         </p:nvCxnSpPr>
         <p:spPr>
-          <a:xfrm flipH="1">
-            <a:off x="2410634" y="3361458"/>
-            <a:ext cx="1831132" cy="888711"/>
-          </a:xfrm>
-          <a:prstGeom prst="straightConnector1">
-            <a:avLst/>
-          </a:prstGeom>
-          <a:ln>
-            <a:solidFill>
-              <a:schemeClr val="tx1"/>
-            </a:solidFill>
-            <a:headEnd type="arrow"/>
-            <a:tailEnd type="none"/>
-          </a:ln>
+          <a:xfrm>
+            <a:off x="3746500" y="4483100"/>
+            <a:ext cx="0" cy="977900"/>
+          </a:xfrm>
+          <a:prstGeom prst="line">
+            <a:avLst/>
+          </a:prstGeom>
         </p:spPr>
         <p:style>
           <a:lnRef idx="2">
@@ -4054,26 +4783,18 @@
       </p:cxnSp>
       <p:cxnSp>
         <p:nvCxnSpPr>
-          <p:cNvPr id="6" name="Straight Arrow Connector 5"/>
-          <p:cNvCxnSpPr>
-            <a:endCxn id="18" idx="5"/>
-          </p:cNvCxnSpPr>
+          <p:cNvPr id="35" name="Straight Connector 34"/>
+          <p:cNvCxnSpPr/>
           <p:nvPr/>
         </p:nvCxnSpPr>
         <p:spPr>
-          <a:xfrm flipH="1" flipV="1">
-            <a:off x="2508207" y="4342574"/>
-            <a:ext cx="1829615" cy="1023472"/>
-          </a:xfrm>
-          <a:prstGeom prst="straightConnector1">
-            <a:avLst/>
-          </a:prstGeom>
-          <a:ln>
-            <a:solidFill>
-              <a:schemeClr val="tx1"/>
-            </a:solidFill>
-            <a:tailEnd type="arrow"/>
-          </a:ln>
+          <a:xfrm>
+            <a:off x="1955800" y="4483100"/>
+            <a:ext cx="0" cy="977900"/>
+          </a:xfrm>
+          <a:prstGeom prst="line">
+            <a:avLst/>
+          </a:prstGeom>
         </p:spPr>
         <p:style>
           <a:lnRef idx="2">
@@ -4092,27 +4813,18 @@
       </p:cxnSp>
       <p:cxnSp>
         <p:nvCxnSpPr>
-          <p:cNvPr id="7" name="Straight Arrow Connector 6"/>
-          <p:cNvCxnSpPr>
-            <a:stCxn id="17" idx="3"/>
-          </p:cNvCxnSpPr>
+          <p:cNvPr id="27" name="Straight Connector 26"/>
+          <p:cNvCxnSpPr/>
           <p:nvPr/>
         </p:nvCxnSpPr>
         <p:spPr>
-          <a:xfrm flipH="1">
-            <a:off x="4337822" y="4342574"/>
-            <a:ext cx="1849782" cy="1023472"/>
-          </a:xfrm>
-          <a:prstGeom prst="straightConnector1">
-            <a:avLst/>
-          </a:prstGeom>
-          <a:ln>
-            <a:solidFill>
-              <a:schemeClr val="tx1"/>
-            </a:solidFill>
-            <a:headEnd type="arrow"/>
-            <a:tailEnd type="none"/>
-          </a:ln>
+          <a:xfrm>
+            <a:off x="6286500" y="2108200"/>
+            <a:ext cx="0" cy="977900"/>
+          </a:xfrm>
+          <a:prstGeom prst="line">
+            <a:avLst/>
+          </a:prstGeom>
         </p:spPr>
         <p:style>
           <a:lnRef idx="2">
@@ -4131,28 +4843,453 @@
       </p:cxnSp>
       <p:cxnSp>
         <p:nvCxnSpPr>
-          <p:cNvPr id="8" name="Straight Arrow Connector 7"/>
-          <p:cNvCxnSpPr>
-            <a:stCxn id="16" idx="1"/>
-            <a:endCxn id="15" idx="6"/>
-          </p:cNvCxnSpPr>
+          <p:cNvPr id="26" name="Straight Connector 25"/>
+          <p:cNvCxnSpPr/>
           <p:nvPr/>
         </p:nvCxnSpPr>
         <p:spPr>
-          <a:xfrm flipH="1" flipV="1">
-            <a:off x="4493260" y="1356176"/>
-            <a:ext cx="1694344" cy="735753"/>
-          </a:xfrm>
-          <a:prstGeom prst="straightConnector1">
-            <a:avLst/>
-          </a:prstGeom>
+          <a:xfrm>
+            <a:off x="3009900" y="2108200"/>
+            <a:ext cx="0" cy="977900"/>
+          </a:xfrm>
+          <a:prstGeom prst="line">
+            <a:avLst/>
+          </a:prstGeom>
+        </p:spPr>
+        <p:style>
+          <a:lnRef idx="2">
+            <a:schemeClr val="accent1"/>
+          </a:lnRef>
+          <a:fillRef idx="0">
+            <a:schemeClr val="accent1"/>
+          </a:fillRef>
+          <a:effectRef idx="1">
+            <a:schemeClr val="accent1"/>
+          </a:effectRef>
+          <a:fontRef idx="minor">
+            <a:schemeClr val="tx1"/>
+          </a:fontRef>
+        </p:style>
+      </p:cxnSp>
+      <p:sp>
+        <p:nvSpPr>
+          <p:cNvPr id="4" name="Rectangle 3"/>
+          <p:cNvSpPr/>
+          <p:nvPr/>
+        </p:nvSpPr>
+        <p:spPr>
+          <a:xfrm>
+            <a:off x="3403600" y="520700"/>
+            <a:ext cx="2273300" cy="711200"/>
+          </a:xfrm>
+          <a:prstGeom prst="rect">
+            <a:avLst/>
+          </a:prstGeom>
+        </p:spPr>
+        <p:style>
+          <a:lnRef idx="1">
+            <a:schemeClr val="accent1"/>
+          </a:lnRef>
+          <a:fillRef idx="3">
+            <a:schemeClr val="accent1"/>
+          </a:fillRef>
+          <a:effectRef idx="2">
+            <a:schemeClr val="accent1"/>
+          </a:effectRef>
+          <a:fontRef idx="minor">
+            <a:schemeClr val="lt1"/>
+          </a:fontRef>
+        </p:style>
+        <p:txBody>
+          <a:bodyPr rtlCol="0" anchor="ctr"/>
+          <a:lstStyle/>
+          <a:p>
+            <a:pPr algn="ctr"/>
+            <a:r>
+              <a:rPr lang="en-US" sz="2800" dirty="0" smtClean="0"/>
+              <a:t>Job Directory</a:t>
+            </a:r>
+            <a:endParaRPr lang="en-US" sz="2800" dirty="0"/>
+          </a:p>
+        </p:txBody>
+      </p:sp>
+      <p:sp>
+        <p:nvSpPr>
+          <p:cNvPr id="5" name="Rectangle 4"/>
+          <p:cNvSpPr/>
+          <p:nvPr/>
+        </p:nvSpPr>
+        <p:spPr>
+          <a:xfrm>
+            <a:off x="2540000" y="2997200"/>
+            <a:ext cx="952500" cy="711200"/>
+          </a:xfrm>
+          <a:prstGeom prst="rect">
+            <a:avLst/>
+          </a:prstGeom>
+        </p:spPr>
+        <p:style>
+          <a:lnRef idx="1">
+            <a:schemeClr val="accent1"/>
+          </a:lnRef>
+          <a:fillRef idx="3">
+            <a:schemeClr val="accent1"/>
+          </a:fillRef>
+          <a:effectRef idx="2">
+            <a:schemeClr val="accent1"/>
+          </a:effectRef>
+          <a:fontRef idx="minor">
+            <a:schemeClr val="lt1"/>
+          </a:fontRef>
+        </p:style>
+        <p:txBody>
+          <a:bodyPr rtlCol="0" anchor="ctr"/>
+          <a:lstStyle/>
+          <a:p>
+            <a:pPr algn="ctr"/>
+            <a:r>
+              <a:rPr lang="en-US" sz="2800" dirty="0" smtClean="0"/>
+              <a:t>in</a:t>
+            </a:r>
+            <a:endParaRPr lang="en-US" sz="2800" dirty="0"/>
+          </a:p>
+        </p:txBody>
+      </p:sp>
+      <p:sp>
+        <p:nvSpPr>
+          <p:cNvPr id="6" name="Rectangle 5"/>
+          <p:cNvSpPr/>
+          <p:nvPr/>
+        </p:nvSpPr>
+        <p:spPr>
+          <a:xfrm>
+            <a:off x="5765800" y="2997200"/>
+            <a:ext cx="952500" cy="711200"/>
+          </a:xfrm>
+          <a:prstGeom prst="rect">
+            <a:avLst/>
+          </a:prstGeom>
+        </p:spPr>
+        <p:style>
+          <a:lnRef idx="1">
+            <a:schemeClr val="accent1"/>
+          </a:lnRef>
+          <a:fillRef idx="3">
+            <a:schemeClr val="accent1"/>
+          </a:fillRef>
+          <a:effectRef idx="2">
+            <a:schemeClr val="accent1"/>
+          </a:effectRef>
+          <a:fontRef idx="minor">
+            <a:schemeClr val="lt1"/>
+          </a:fontRef>
+        </p:style>
+        <p:txBody>
+          <a:bodyPr rtlCol="0" anchor="ctr"/>
+          <a:lstStyle/>
+          <a:p>
+            <a:pPr algn="ctr"/>
+            <a:r>
+              <a:rPr lang="en-US" sz="2800" dirty="0" smtClean="0"/>
+              <a:t>out</a:t>
+            </a:r>
+            <a:endParaRPr lang="en-US" sz="2800" dirty="0"/>
+          </a:p>
+        </p:txBody>
+      </p:sp>
+      <p:sp>
+        <p:nvSpPr>
+          <p:cNvPr id="7" name="Rounded Rectangle 6"/>
+          <p:cNvSpPr/>
+          <p:nvPr/>
+        </p:nvSpPr>
+        <p:spPr>
+          <a:xfrm>
+            <a:off x="533400" y="3086100"/>
+            <a:ext cx="1143000" cy="622300"/>
+          </a:xfrm>
+          <a:prstGeom prst="roundRect">
+            <a:avLst/>
+          </a:prstGeom>
+          <a:solidFill>
+            <a:srgbClr val="FF0000"/>
+          </a:solidFill>
+        </p:spPr>
+        <p:style>
+          <a:lnRef idx="1">
+            <a:schemeClr val="accent1"/>
+          </a:lnRef>
+          <a:fillRef idx="3">
+            <a:schemeClr val="accent1"/>
+          </a:fillRef>
+          <a:effectRef idx="2">
+            <a:schemeClr val="accent1"/>
+          </a:effectRef>
+          <a:fontRef idx="minor">
+            <a:schemeClr val="lt1"/>
+          </a:fontRef>
+        </p:style>
+        <p:txBody>
+          <a:bodyPr rtlCol="0" anchor="ctr"/>
+          <a:lstStyle/>
+          <a:p>
+            <a:pPr algn="ctr"/>
+            <a:r>
+              <a:rPr lang="en-US" sz="2800" dirty="0" smtClean="0"/>
+              <a:t>input</a:t>
+            </a:r>
+            <a:endParaRPr lang="en-US" sz="2800" dirty="0"/>
+          </a:p>
+        </p:txBody>
+      </p:sp>
+      <p:sp>
+        <p:nvSpPr>
+          <p:cNvPr id="8" name="Rounded Rectangle 7"/>
+          <p:cNvSpPr/>
+          <p:nvPr/>
+        </p:nvSpPr>
+        <p:spPr>
+          <a:xfrm>
+            <a:off x="7454900" y="3086100"/>
+            <a:ext cx="1244600" cy="622300"/>
+          </a:xfrm>
+          <a:prstGeom prst="roundRect">
+            <a:avLst/>
+          </a:prstGeom>
+          <a:solidFill>
+            <a:srgbClr val="FF0000"/>
+          </a:solidFill>
+        </p:spPr>
+        <p:style>
+          <a:lnRef idx="1">
+            <a:schemeClr val="accent1"/>
+          </a:lnRef>
+          <a:fillRef idx="3">
+            <a:schemeClr val="accent1"/>
+          </a:fillRef>
+          <a:effectRef idx="2">
+            <a:schemeClr val="accent1"/>
+          </a:effectRef>
+          <a:fontRef idx="minor">
+            <a:schemeClr val="lt1"/>
+          </a:fontRef>
+        </p:style>
+        <p:txBody>
+          <a:bodyPr rtlCol="0" anchor="ctr"/>
+          <a:lstStyle/>
+          <a:p>
+            <a:pPr algn="ctr"/>
+            <a:r>
+              <a:rPr lang="en-US" sz="2800" dirty="0" smtClean="0"/>
+              <a:t>output</a:t>
+            </a:r>
+            <a:endParaRPr lang="en-US" sz="2800" dirty="0"/>
+          </a:p>
+        </p:txBody>
+      </p:sp>
+      <p:sp>
+        <p:nvSpPr>
+          <p:cNvPr id="9" name="Rounded Rectangle 8"/>
+          <p:cNvSpPr/>
+          <p:nvPr/>
+        </p:nvSpPr>
+        <p:spPr>
+          <a:xfrm>
+            <a:off x="774700" y="5295900"/>
+            <a:ext cx="520700" cy="533400"/>
+          </a:xfrm>
+          <a:prstGeom prst="roundRect">
+            <a:avLst/>
+          </a:prstGeom>
+          <a:solidFill>
+            <a:srgbClr val="FF0000"/>
+          </a:solidFill>
+        </p:spPr>
+        <p:style>
+          <a:lnRef idx="1">
+            <a:schemeClr val="accent1"/>
+          </a:lnRef>
+          <a:fillRef idx="3">
+            <a:schemeClr val="accent1"/>
+          </a:fillRef>
+          <a:effectRef idx="2">
+            <a:schemeClr val="accent1"/>
+          </a:effectRef>
+          <a:fontRef idx="minor">
+            <a:schemeClr val="lt1"/>
+          </a:fontRef>
+        </p:style>
+        <p:txBody>
+          <a:bodyPr rtlCol="0" anchor="ctr"/>
+          <a:lstStyle/>
+          <a:p>
+            <a:pPr algn="ctr"/>
+            <a:r>
+              <a:rPr lang="en-US" sz="2800" dirty="0" smtClean="0"/>
+              <a:t>1</a:t>
+            </a:r>
+            <a:endParaRPr lang="en-US" sz="2800" dirty="0"/>
+          </a:p>
+        </p:txBody>
+      </p:sp>
+      <p:sp>
+        <p:nvSpPr>
+          <p:cNvPr id="10" name="Rounded Rectangle 9"/>
+          <p:cNvSpPr/>
+          <p:nvPr/>
+        </p:nvSpPr>
+        <p:spPr>
+          <a:xfrm>
+            <a:off x="1676400" y="5295900"/>
+            <a:ext cx="520700" cy="533400"/>
+          </a:xfrm>
+          <a:prstGeom prst="roundRect">
+            <a:avLst/>
+          </a:prstGeom>
+          <a:solidFill>
+            <a:srgbClr val="FF0000"/>
+          </a:solidFill>
+        </p:spPr>
+        <p:style>
+          <a:lnRef idx="1">
+            <a:schemeClr val="accent1"/>
+          </a:lnRef>
+          <a:fillRef idx="3">
+            <a:schemeClr val="accent1"/>
+          </a:fillRef>
+          <a:effectRef idx="2">
+            <a:schemeClr val="accent1"/>
+          </a:effectRef>
+          <a:fontRef idx="minor">
+            <a:schemeClr val="lt1"/>
+          </a:fontRef>
+        </p:style>
+        <p:txBody>
+          <a:bodyPr rtlCol="0" anchor="ctr"/>
+          <a:lstStyle/>
+          <a:p>
+            <a:pPr algn="ctr"/>
+            <a:r>
+              <a:rPr lang="en-US" sz="2800" dirty="0" smtClean="0"/>
+              <a:t>2</a:t>
+            </a:r>
+            <a:endParaRPr lang="en-US" sz="2800" dirty="0"/>
+          </a:p>
+        </p:txBody>
+      </p:sp>
+      <p:sp>
+        <p:nvSpPr>
+          <p:cNvPr id="11" name="Rounded Rectangle 10"/>
+          <p:cNvSpPr/>
+          <p:nvPr/>
+        </p:nvSpPr>
+        <p:spPr>
+          <a:xfrm>
+            <a:off x="3492500" y="5295900"/>
+            <a:ext cx="520700" cy="533400"/>
+          </a:xfrm>
+          <a:prstGeom prst="roundRect">
+            <a:avLst/>
+          </a:prstGeom>
+          <a:solidFill>
+            <a:srgbClr val="FF0000"/>
+          </a:solidFill>
+        </p:spPr>
+        <p:style>
+          <a:lnRef idx="1">
+            <a:schemeClr val="accent1"/>
+          </a:lnRef>
+          <a:fillRef idx="3">
+            <a:schemeClr val="accent1"/>
+          </a:fillRef>
+          <a:effectRef idx="2">
+            <a:schemeClr val="accent1"/>
+          </a:effectRef>
+          <a:fontRef idx="minor">
+            <a:schemeClr val="lt1"/>
+          </a:fontRef>
+        </p:style>
+        <p:txBody>
+          <a:bodyPr rtlCol="0" anchor="ctr"/>
+          <a:lstStyle/>
+          <a:p>
+            <a:pPr algn="ctr"/>
+            <a:r>
+              <a:rPr lang="en-US" sz="2800" dirty="0" smtClean="0"/>
+              <a:t>n</a:t>
+            </a:r>
+            <a:endParaRPr lang="en-US" sz="2800" dirty="0"/>
+          </a:p>
+        </p:txBody>
+      </p:sp>
+      <p:sp>
+        <p:nvSpPr>
+          <p:cNvPr id="12" name="Rectangle 11"/>
+          <p:cNvSpPr/>
+          <p:nvPr/>
+        </p:nvSpPr>
+        <p:spPr>
+          <a:xfrm>
+            <a:off x="2311400" y="5295900"/>
+            <a:ext cx="1092200" cy="533400"/>
+          </a:xfrm>
+          <a:prstGeom prst="rect">
+            <a:avLst/>
+          </a:prstGeom>
+          <a:noFill/>
           <a:ln>
-            <a:solidFill>
-              <a:schemeClr val="tx1"/>
-            </a:solidFill>
-            <a:headEnd type="arrow"/>
-            <a:tailEnd type="none"/>
+            <a:noFill/>
           </a:ln>
+        </p:spPr>
+        <p:style>
+          <a:lnRef idx="1">
+            <a:schemeClr val="accent1"/>
+          </a:lnRef>
+          <a:fillRef idx="3">
+            <a:schemeClr val="accent1"/>
+          </a:fillRef>
+          <a:effectRef idx="2">
+            <a:schemeClr val="accent1"/>
+          </a:effectRef>
+          <a:fontRef idx="minor">
+            <a:schemeClr val="lt1"/>
+          </a:fontRef>
+        </p:style>
+        <p:txBody>
+          <a:bodyPr rtlCol="0" anchor="ctr"/>
+          <a:lstStyle/>
+          <a:p>
+            <a:pPr algn="ctr"/>
+            <a:r>
+              <a:rPr lang="en-US" sz="3200" dirty="0" smtClean="0">
+                <a:solidFill>
+                  <a:schemeClr val="tx1"/>
+                </a:solidFill>
+              </a:rPr>
+              <a:t>. . .</a:t>
+            </a:r>
+            <a:endParaRPr lang="en-US" sz="3200" dirty="0">
+              <a:solidFill>
+                <a:schemeClr val="tx1"/>
+              </a:solidFill>
+            </a:endParaRPr>
+          </a:p>
+        </p:txBody>
+      </p:sp>
+      <p:cxnSp>
+        <p:nvCxnSpPr>
+          <p:cNvPr id="18" name="Straight Connector 17"/>
+          <p:cNvCxnSpPr/>
+          <p:nvPr/>
+        </p:nvCxnSpPr>
+        <p:spPr>
+          <a:xfrm flipV="1">
+            <a:off x="1104900" y="2095500"/>
+            <a:ext cx="6997700" cy="12700"/>
+          </a:xfrm>
+          <a:prstGeom prst="line">
+            <a:avLst/>
+          </a:prstGeom>
         </p:spPr>
         <p:style>
           <a:lnRef idx="2">
@@ -4171,26 +5308,18 @@
       </p:cxnSp>
       <p:cxnSp>
         <p:nvCxnSpPr>
-          <p:cNvPr id="9" name="Straight Arrow Connector 8"/>
-          <p:cNvCxnSpPr>
-            <a:endCxn id="17" idx="0"/>
-          </p:cNvCxnSpPr>
+          <p:cNvPr id="19" name="Straight Connector 18"/>
+          <p:cNvCxnSpPr/>
           <p:nvPr/>
         </p:nvCxnSpPr>
         <p:spPr>
-          <a:xfrm>
-            <a:off x="6275643" y="2194184"/>
-            <a:ext cx="18650" cy="1901524"/>
-          </a:xfrm>
-          <a:prstGeom prst="straightConnector1">
-            <a:avLst/>
-          </a:prstGeom>
-          <a:ln>
-            <a:solidFill>
-              <a:schemeClr val="tx1"/>
-            </a:solidFill>
-            <a:tailEnd type="arrow"/>
-          </a:ln>
+          <a:xfrm flipV="1">
+            <a:off x="1028700" y="4470400"/>
+            <a:ext cx="2717800" cy="12700"/>
+          </a:xfrm>
+          <a:prstGeom prst="line">
+            <a:avLst/>
+          </a:prstGeom>
         </p:spPr>
         <p:style>
           <a:lnRef idx="2">
@@ -4209,24 +5338,20 @@
       </p:cxnSp>
       <p:cxnSp>
         <p:nvCxnSpPr>
-          <p:cNvPr id="10" name="Straight Arrow Connector 9"/>
-          <p:cNvCxnSpPr/>
+          <p:cNvPr id="23" name="Straight Connector 22"/>
+          <p:cNvCxnSpPr>
+            <a:endCxn id="7" idx="0"/>
+          </p:cNvCxnSpPr>
           <p:nvPr/>
         </p:nvCxnSpPr>
         <p:spPr>
           <a:xfrm>
-            <a:off x="2391984" y="2232048"/>
-            <a:ext cx="18650" cy="1901524"/>
-          </a:xfrm>
-          <a:prstGeom prst="straightConnector1">
-            <a:avLst/>
-          </a:prstGeom>
-          <a:ln>
-            <a:solidFill>
-              <a:schemeClr val="tx1"/>
-            </a:solidFill>
-            <a:tailEnd type="arrow"/>
-          </a:ln>
+            <a:off x="1104900" y="2108200"/>
+            <a:ext cx="0" cy="977900"/>
+          </a:xfrm>
+          <a:prstGeom prst="line">
+            <a:avLst/>
+          </a:prstGeom>
         </p:spPr>
         <p:style>
           <a:lnRef idx="2">
@@ -4245,387 +5370,18 @@
       </p:cxnSp>
       <p:cxnSp>
         <p:nvCxnSpPr>
-          <p:cNvPr id="11" name="Straight Arrow Connector 10"/>
-          <p:cNvCxnSpPr>
-            <a:endCxn id="12" idx="6"/>
-          </p:cNvCxnSpPr>
+          <p:cNvPr id="28" name="Straight Connector 27"/>
+          <p:cNvCxnSpPr/>
           <p:nvPr/>
         </p:nvCxnSpPr>
         <p:spPr>
-          <a:xfrm flipH="1">
-            <a:off x="2552399" y="1370532"/>
-            <a:ext cx="1785422" cy="823652"/>
-          </a:xfrm>
-          <a:prstGeom prst="straightConnector1">
-            <a:avLst/>
-          </a:prstGeom>
-          <a:ln>
-            <a:solidFill>
-              <a:schemeClr val="tx1"/>
-            </a:solidFill>
-            <a:tailEnd type="arrow"/>
-          </a:ln>
-        </p:spPr>
-        <p:style>
-          <a:lnRef idx="2">
-            <a:schemeClr val="accent1"/>
-          </a:lnRef>
-          <a:fillRef idx="0">
-            <a:schemeClr val="accent1"/>
-          </a:fillRef>
-          <a:effectRef idx="1">
-            <a:schemeClr val="accent1"/>
-          </a:effectRef>
-          <a:fontRef idx="minor">
-            <a:schemeClr val="tx1"/>
-          </a:fontRef>
-        </p:style>
-      </p:cxnSp>
-      <p:sp>
-        <p:nvSpPr>
-          <p:cNvPr id="12" name="Oval 11"/>
-          <p:cNvSpPr/>
-          <p:nvPr/>
-        </p:nvSpPr>
-        <p:spPr>
-          <a:xfrm>
-            <a:off x="2250637" y="2049573"/>
-            <a:ext cx="301762" cy="289222"/>
-          </a:xfrm>
-          <a:prstGeom prst="ellipse">
-            <a:avLst/>
-          </a:prstGeom>
-          <a:solidFill>
-            <a:srgbClr val="4F81BD"/>
-          </a:solidFill>
-          <a:ln>
-            <a:solidFill>
-              <a:schemeClr val="tx1"/>
-            </a:solidFill>
-          </a:ln>
-        </p:spPr>
-        <p:style>
-          <a:lnRef idx="1">
-            <a:schemeClr val="accent1"/>
-          </a:lnRef>
-          <a:fillRef idx="3">
-            <a:schemeClr val="accent1"/>
-          </a:fillRef>
-          <a:effectRef idx="2">
-            <a:schemeClr val="accent1"/>
-          </a:effectRef>
-          <a:fontRef idx="minor">
-            <a:schemeClr val="lt1"/>
-          </a:fontRef>
-        </p:style>
-        <p:txBody>
-          <a:bodyPr rtlCol="0" anchor="ctr"/>
-          <a:lstStyle/>
-          <a:p>
-            <a:pPr algn="ctr"/>
-            <a:endParaRPr lang="en-US"/>
-          </a:p>
-        </p:txBody>
-      </p:sp>
-      <p:sp>
-        <p:nvSpPr>
-          <p:cNvPr id="13" name="Oval 12"/>
-          <p:cNvSpPr/>
-          <p:nvPr/>
-        </p:nvSpPr>
-        <p:spPr>
-          <a:xfrm>
-            <a:off x="4191498" y="3182810"/>
-            <a:ext cx="301762" cy="289222"/>
-          </a:xfrm>
-          <a:prstGeom prst="ellipse">
-            <a:avLst/>
-          </a:prstGeom>
-          <a:solidFill>
-            <a:srgbClr val="4F81BD"/>
-          </a:solidFill>
-          <a:ln>
-            <a:solidFill>
-              <a:schemeClr val="tx1"/>
-            </a:solidFill>
-          </a:ln>
-        </p:spPr>
-        <p:style>
-          <a:lnRef idx="1">
-            <a:schemeClr val="accent1"/>
-          </a:lnRef>
-          <a:fillRef idx="3">
-            <a:schemeClr val="accent1"/>
-          </a:fillRef>
-          <a:effectRef idx="2">
-            <a:schemeClr val="accent1"/>
-          </a:effectRef>
-          <a:fontRef idx="minor">
-            <a:schemeClr val="lt1"/>
-          </a:fontRef>
-        </p:style>
-        <p:txBody>
-          <a:bodyPr rtlCol="0" anchor="ctr"/>
-          <a:lstStyle/>
-          <a:p>
-            <a:pPr algn="ctr"/>
-            <a:endParaRPr lang="en-US"/>
-          </a:p>
-        </p:txBody>
-      </p:sp>
-      <p:sp>
-        <p:nvSpPr>
-          <p:cNvPr id="14" name="Oval 13"/>
-          <p:cNvSpPr/>
-          <p:nvPr/>
-        </p:nvSpPr>
-        <p:spPr>
-          <a:xfrm>
-            <a:off x="4191498" y="5221435"/>
-            <a:ext cx="301762" cy="289222"/>
-          </a:xfrm>
-          <a:prstGeom prst="ellipse">
-            <a:avLst/>
-          </a:prstGeom>
-          <a:solidFill>
-            <a:srgbClr val="C0504D"/>
-          </a:solidFill>
-          <a:ln>
-            <a:solidFill>
-              <a:schemeClr val="tx1"/>
-            </a:solidFill>
-          </a:ln>
-        </p:spPr>
-        <p:style>
-          <a:lnRef idx="1">
-            <a:schemeClr val="accent1"/>
-          </a:lnRef>
-          <a:fillRef idx="3">
-            <a:schemeClr val="accent1"/>
-          </a:fillRef>
-          <a:effectRef idx="2">
-            <a:schemeClr val="accent1"/>
-          </a:effectRef>
-          <a:fontRef idx="minor">
-            <a:schemeClr val="lt1"/>
-          </a:fontRef>
-        </p:style>
-        <p:txBody>
-          <a:bodyPr rtlCol="0" anchor="ctr"/>
-          <a:lstStyle/>
-          <a:p>
-            <a:pPr algn="ctr"/>
-            <a:endParaRPr lang="en-US"/>
-          </a:p>
-        </p:txBody>
-      </p:sp>
-      <p:sp>
-        <p:nvSpPr>
-          <p:cNvPr id="15" name="Oval 14"/>
-          <p:cNvSpPr/>
-          <p:nvPr/>
-        </p:nvSpPr>
-        <p:spPr>
-          <a:xfrm>
-            <a:off x="4191498" y="1211565"/>
-            <a:ext cx="301762" cy="289222"/>
-          </a:xfrm>
-          <a:prstGeom prst="ellipse">
-            <a:avLst/>
-          </a:prstGeom>
-          <a:solidFill>
-            <a:schemeClr val="accent2"/>
-          </a:solidFill>
-          <a:ln>
-            <a:solidFill>
-              <a:schemeClr val="tx1"/>
-            </a:solidFill>
-          </a:ln>
-        </p:spPr>
-        <p:style>
-          <a:lnRef idx="1">
-            <a:schemeClr val="accent1"/>
-          </a:lnRef>
-          <a:fillRef idx="3">
-            <a:schemeClr val="accent1"/>
-          </a:fillRef>
-          <a:effectRef idx="2">
-            <a:schemeClr val="accent1"/>
-          </a:effectRef>
-          <a:fontRef idx="minor">
-            <a:schemeClr val="lt1"/>
-          </a:fontRef>
-        </p:style>
-        <p:txBody>
-          <a:bodyPr rtlCol="0" anchor="ctr"/>
-          <a:lstStyle/>
-          <a:p>
-            <a:pPr algn="ctr"/>
-            <a:endParaRPr lang="en-US"/>
-          </a:p>
-        </p:txBody>
-      </p:sp>
-      <p:sp>
-        <p:nvSpPr>
-          <p:cNvPr id="16" name="Oval 15"/>
-          <p:cNvSpPr/>
-          <p:nvPr/>
-        </p:nvSpPr>
-        <p:spPr>
-          <a:xfrm>
-            <a:off x="6143412" y="2049573"/>
-            <a:ext cx="301762" cy="289222"/>
-          </a:xfrm>
-          <a:prstGeom prst="ellipse">
-            <a:avLst/>
-          </a:prstGeom>
-          <a:solidFill>
-            <a:schemeClr val="accent1"/>
-          </a:solidFill>
-          <a:ln>
-            <a:solidFill>
-              <a:schemeClr val="tx1"/>
-            </a:solidFill>
-          </a:ln>
-        </p:spPr>
-        <p:style>
-          <a:lnRef idx="1">
-            <a:schemeClr val="accent1"/>
-          </a:lnRef>
-          <a:fillRef idx="3">
-            <a:schemeClr val="accent1"/>
-          </a:fillRef>
-          <a:effectRef idx="2">
-            <a:schemeClr val="accent1"/>
-          </a:effectRef>
-          <a:fontRef idx="minor">
-            <a:schemeClr val="lt1"/>
-          </a:fontRef>
-        </p:style>
-        <p:txBody>
-          <a:bodyPr rtlCol="0" anchor="ctr"/>
-          <a:lstStyle/>
-          <a:p>
-            <a:pPr algn="ctr"/>
-            <a:endParaRPr lang="en-US"/>
-          </a:p>
-        </p:txBody>
-      </p:sp>
-      <p:sp>
-        <p:nvSpPr>
-          <p:cNvPr id="17" name="Oval 16"/>
-          <p:cNvSpPr/>
-          <p:nvPr/>
-        </p:nvSpPr>
-        <p:spPr>
-          <a:xfrm>
-            <a:off x="6143412" y="4095708"/>
-            <a:ext cx="301762" cy="289222"/>
-          </a:xfrm>
-          <a:prstGeom prst="ellipse">
-            <a:avLst/>
-          </a:prstGeom>
-          <a:solidFill>
-            <a:srgbClr val="4F81BD"/>
-          </a:solidFill>
-          <a:ln>
-            <a:solidFill>
-              <a:schemeClr val="tx1"/>
-            </a:solidFill>
-          </a:ln>
-        </p:spPr>
-        <p:style>
-          <a:lnRef idx="1">
-            <a:schemeClr val="accent1"/>
-          </a:lnRef>
-          <a:fillRef idx="3">
-            <a:schemeClr val="accent1"/>
-          </a:fillRef>
-          <a:effectRef idx="2">
-            <a:schemeClr val="accent1"/>
-          </a:effectRef>
-          <a:fontRef idx="minor">
-            <a:schemeClr val="lt1"/>
-          </a:fontRef>
-        </p:style>
-        <p:txBody>
-          <a:bodyPr rtlCol="0" anchor="ctr"/>
-          <a:lstStyle/>
-          <a:p>
-            <a:pPr algn="ctr"/>
-            <a:endParaRPr lang="en-US"/>
-          </a:p>
-        </p:txBody>
-      </p:sp>
-      <p:sp>
-        <p:nvSpPr>
-          <p:cNvPr id="18" name="Oval 17"/>
-          <p:cNvSpPr/>
-          <p:nvPr/>
-        </p:nvSpPr>
-        <p:spPr>
-          <a:xfrm>
-            <a:off x="2250637" y="4095708"/>
-            <a:ext cx="301762" cy="289222"/>
-          </a:xfrm>
-          <a:prstGeom prst="ellipse">
-            <a:avLst/>
-          </a:prstGeom>
-          <a:solidFill>
-            <a:srgbClr val="4F81BD"/>
-          </a:solidFill>
-          <a:ln>
-            <a:solidFill>
-              <a:schemeClr val="tx1"/>
-            </a:solidFill>
-          </a:ln>
-        </p:spPr>
-        <p:style>
-          <a:lnRef idx="1">
-            <a:schemeClr val="accent1"/>
-          </a:lnRef>
-          <a:fillRef idx="3">
-            <a:schemeClr val="accent1"/>
-          </a:fillRef>
-          <a:effectRef idx="2">
-            <a:schemeClr val="accent1"/>
-          </a:effectRef>
-          <a:fontRef idx="minor">
-            <a:schemeClr val="lt1"/>
-          </a:fontRef>
-        </p:style>
-        <p:txBody>
-          <a:bodyPr rtlCol="0" anchor="ctr"/>
-          <a:lstStyle/>
-          <a:p>
-            <a:pPr algn="ctr"/>
-            <a:endParaRPr lang="en-US"/>
-          </a:p>
-        </p:txBody>
-      </p:sp>
-      <p:cxnSp>
-        <p:nvCxnSpPr>
-          <p:cNvPr id="19" name="Straight Arrow Connector 18"/>
-          <p:cNvCxnSpPr>
-            <a:stCxn id="15" idx="4"/>
-            <a:endCxn id="13" idx="0"/>
-          </p:cNvCxnSpPr>
-          <p:nvPr/>
-        </p:nvCxnSpPr>
-        <p:spPr>
-          <a:xfrm>
-            <a:off x="4342379" y="1500787"/>
-            <a:ext cx="0" cy="1682023"/>
-          </a:xfrm>
-          <a:prstGeom prst="straightConnector1">
-            <a:avLst/>
-          </a:prstGeom>
-          <a:ln>
-            <a:solidFill>
-              <a:schemeClr val="tx1"/>
-            </a:solidFill>
-            <a:tailEnd type="arrow"/>
-          </a:ln>
+          <a:xfrm>
+            <a:off x="8077200" y="2108200"/>
+            <a:ext cx="0" cy="977900"/>
+          </a:xfrm>
+          <a:prstGeom prst="line">
+            <a:avLst/>
+          </a:prstGeom>
         </p:spPr>
         <p:style>
           <a:lnRef idx="2">
@@ -4644,27 +5400,20 @@
       </p:cxnSp>
       <p:cxnSp>
         <p:nvCxnSpPr>
-          <p:cNvPr id="20" name="Straight Arrow Connector 19"/>
+          <p:cNvPr id="29" name="Straight Connector 28"/>
           <p:cNvCxnSpPr>
-            <a:stCxn id="12" idx="5"/>
-            <a:endCxn id="13" idx="1"/>
+            <a:stCxn id="4" idx="2"/>
           </p:cNvCxnSpPr>
           <p:nvPr/>
         </p:nvCxnSpPr>
         <p:spPr>
           <a:xfrm>
-            <a:off x="2508207" y="2296439"/>
-            <a:ext cx="1727483" cy="928727"/>
-          </a:xfrm>
-          <a:prstGeom prst="straightConnector1">
-            <a:avLst/>
-          </a:prstGeom>
-          <a:ln>
-            <a:solidFill>
-              <a:schemeClr val="tx1"/>
-            </a:solidFill>
-            <a:tailEnd type="arrow"/>
-          </a:ln>
+            <a:off x="4540250" y="1231900"/>
+            <a:ext cx="0" cy="876300"/>
+          </a:xfrm>
+          <a:prstGeom prst="line">
+            <a:avLst/>
+          </a:prstGeom>
         </p:spPr>
         <p:style>
           <a:lnRef idx="2">
@@ -4683,27 +5432,20 @@
       </p:cxnSp>
       <p:cxnSp>
         <p:nvCxnSpPr>
-          <p:cNvPr id="21" name="Straight Arrow Connector 20"/>
+          <p:cNvPr id="37" name="Straight Connector 36"/>
           <p:cNvCxnSpPr>
-            <a:stCxn id="13" idx="6"/>
-            <a:endCxn id="16" idx="3"/>
+            <a:stCxn id="5" idx="2"/>
           </p:cNvCxnSpPr>
           <p:nvPr/>
         </p:nvCxnSpPr>
         <p:spPr>
-          <a:xfrm flipV="1">
-            <a:off x="4493260" y="2296439"/>
-            <a:ext cx="1694344" cy="1030982"/>
-          </a:xfrm>
-          <a:prstGeom prst="straightConnector1">
-            <a:avLst/>
-          </a:prstGeom>
-          <a:ln>
-            <a:solidFill>
-              <a:schemeClr val="tx1"/>
-            </a:solidFill>
-            <a:tailEnd type="arrow"/>
-          </a:ln>
+          <a:xfrm flipH="1">
+            <a:off x="3009900" y="3708400"/>
+            <a:ext cx="6350" cy="762000"/>
+          </a:xfrm>
+          <a:prstGeom prst="line">
+            <a:avLst/>
+          </a:prstGeom>
         </p:spPr>
         <p:style>
           <a:lnRef idx="2">
@@ -4722,27 +5464,327 @@
       </p:cxnSp>
       <p:cxnSp>
         <p:nvCxnSpPr>
-          <p:cNvPr id="22" name="Straight Arrow Connector 21"/>
-          <p:cNvCxnSpPr>
-            <a:stCxn id="13" idx="4"/>
-          </p:cNvCxnSpPr>
+          <p:cNvPr id="40" name="Straight Connector 39"/>
+          <p:cNvCxnSpPr/>
           <p:nvPr/>
         </p:nvCxnSpPr>
         <p:spPr>
           <a:xfrm>
-            <a:off x="4342379" y="3472032"/>
-            <a:ext cx="0" cy="1749403"/>
-          </a:xfrm>
-          <a:prstGeom prst="straightConnector1">
-            <a:avLst/>
-          </a:prstGeom>
+            <a:off x="5397500" y="4495800"/>
+            <a:ext cx="0" cy="977900"/>
+          </a:xfrm>
+          <a:prstGeom prst="line">
+            <a:avLst/>
+          </a:prstGeom>
+        </p:spPr>
+        <p:style>
+          <a:lnRef idx="2">
+            <a:schemeClr val="accent1"/>
+          </a:lnRef>
+          <a:fillRef idx="0">
+            <a:schemeClr val="accent1"/>
+          </a:fillRef>
+          <a:effectRef idx="1">
+            <a:schemeClr val="accent1"/>
+          </a:effectRef>
+          <a:fontRef idx="minor">
+            <a:schemeClr val="tx1"/>
+          </a:fontRef>
+        </p:style>
+      </p:cxnSp>
+      <p:cxnSp>
+        <p:nvCxnSpPr>
+          <p:cNvPr id="41" name="Straight Connector 40"/>
+          <p:cNvCxnSpPr/>
+          <p:nvPr/>
+        </p:nvCxnSpPr>
+        <p:spPr>
+          <a:xfrm>
+            <a:off x="8077200" y="4495800"/>
+            <a:ext cx="0" cy="977900"/>
+          </a:xfrm>
+          <a:prstGeom prst="line">
+            <a:avLst/>
+          </a:prstGeom>
+        </p:spPr>
+        <p:style>
+          <a:lnRef idx="2">
+            <a:schemeClr val="accent1"/>
+          </a:lnRef>
+          <a:fillRef idx="0">
+            <a:schemeClr val="accent1"/>
+          </a:fillRef>
+          <a:effectRef idx="1">
+            <a:schemeClr val="accent1"/>
+          </a:effectRef>
+          <a:fontRef idx="minor">
+            <a:schemeClr val="tx1"/>
+          </a:fontRef>
+        </p:style>
+      </p:cxnSp>
+      <p:cxnSp>
+        <p:nvCxnSpPr>
+          <p:cNvPr id="42" name="Straight Connector 41"/>
+          <p:cNvCxnSpPr/>
+          <p:nvPr/>
+        </p:nvCxnSpPr>
+        <p:spPr>
+          <a:xfrm>
+            <a:off x="6286500" y="4495800"/>
+            <a:ext cx="0" cy="977900"/>
+          </a:xfrm>
+          <a:prstGeom prst="line">
+            <a:avLst/>
+          </a:prstGeom>
+        </p:spPr>
+        <p:style>
+          <a:lnRef idx="2">
+            <a:schemeClr val="accent1"/>
+          </a:lnRef>
+          <a:fillRef idx="0">
+            <a:schemeClr val="accent1"/>
+          </a:fillRef>
+          <a:effectRef idx="1">
+            <a:schemeClr val="accent1"/>
+          </a:effectRef>
+          <a:fontRef idx="minor">
+            <a:schemeClr val="tx1"/>
+          </a:fontRef>
+        </p:style>
+      </p:cxnSp>
+      <p:sp>
+        <p:nvSpPr>
+          <p:cNvPr id="43" name="Rounded Rectangle 42"/>
+          <p:cNvSpPr/>
+          <p:nvPr/>
+        </p:nvSpPr>
+        <p:spPr>
+          <a:xfrm>
+            <a:off x="5105400" y="5308600"/>
+            <a:ext cx="520700" cy="533400"/>
+          </a:xfrm>
+          <a:prstGeom prst="roundRect">
+            <a:avLst/>
+          </a:prstGeom>
+          <a:solidFill>
+            <a:srgbClr val="FF0000"/>
+          </a:solidFill>
+        </p:spPr>
+        <p:style>
+          <a:lnRef idx="1">
+            <a:schemeClr val="accent1"/>
+          </a:lnRef>
+          <a:fillRef idx="3">
+            <a:schemeClr val="accent1"/>
+          </a:fillRef>
+          <a:effectRef idx="2">
+            <a:schemeClr val="accent1"/>
+          </a:effectRef>
+          <a:fontRef idx="minor">
+            <a:schemeClr val="lt1"/>
+          </a:fontRef>
+        </p:style>
+        <p:txBody>
+          <a:bodyPr rtlCol="0" anchor="ctr"/>
+          <a:lstStyle/>
+          <a:p>
+            <a:pPr algn="ctr"/>
+            <a:r>
+              <a:rPr lang="en-US" sz="2800" dirty="0" smtClean="0"/>
+              <a:t>1</a:t>
+            </a:r>
+            <a:endParaRPr lang="en-US" sz="2800" dirty="0"/>
+          </a:p>
+        </p:txBody>
+      </p:sp>
+      <p:sp>
+        <p:nvSpPr>
+          <p:cNvPr id="44" name="Rounded Rectangle 43"/>
+          <p:cNvSpPr/>
+          <p:nvPr/>
+        </p:nvSpPr>
+        <p:spPr>
+          <a:xfrm>
+            <a:off x="6007100" y="5308600"/>
+            <a:ext cx="520700" cy="533400"/>
+          </a:xfrm>
+          <a:prstGeom prst="roundRect">
+            <a:avLst/>
+          </a:prstGeom>
+          <a:solidFill>
+            <a:srgbClr val="FF0000"/>
+          </a:solidFill>
+        </p:spPr>
+        <p:style>
+          <a:lnRef idx="1">
+            <a:schemeClr val="accent1"/>
+          </a:lnRef>
+          <a:fillRef idx="3">
+            <a:schemeClr val="accent1"/>
+          </a:fillRef>
+          <a:effectRef idx="2">
+            <a:schemeClr val="accent1"/>
+          </a:effectRef>
+          <a:fontRef idx="minor">
+            <a:schemeClr val="lt1"/>
+          </a:fontRef>
+        </p:style>
+        <p:txBody>
+          <a:bodyPr rtlCol="0" anchor="ctr"/>
+          <a:lstStyle/>
+          <a:p>
+            <a:pPr algn="ctr"/>
+            <a:r>
+              <a:rPr lang="en-US" sz="2800" dirty="0" smtClean="0"/>
+              <a:t>2</a:t>
+            </a:r>
+            <a:endParaRPr lang="en-US" sz="2800" dirty="0"/>
+          </a:p>
+        </p:txBody>
+      </p:sp>
+      <p:sp>
+        <p:nvSpPr>
+          <p:cNvPr id="45" name="Rounded Rectangle 44"/>
+          <p:cNvSpPr/>
+          <p:nvPr/>
+        </p:nvSpPr>
+        <p:spPr>
+          <a:xfrm>
+            <a:off x="7823200" y="5308600"/>
+            <a:ext cx="520700" cy="533400"/>
+          </a:xfrm>
+          <a:prstGeom prst="roundRect">
+            <a:avLst/>
+          </a:prstGeom>
+          <a:solidFill>
+            <a:srgbClr val="FF0000"/>
+          </a:solidFill>
+        </p:spPr>
+        <p:style>
+          <a:lnRef idx="1">
+            <a:schemeClr val="accent1"/>
+          </a:lnRef>
+          <a:fillRef idx="3">
+            <a:schemeClr val="accent1"/>
+          </a:fillRef>
+          <a:effectRef idx="2">
+            <a:schemeClr val="accent1"/>
+          </a:effectRef>
+          <a:fontRef idx="minor">
+            <a:schemeClr val="lt1"/>
+          </a:fontRef>
+        </p:style>
+        <p:txBody>
+          <a:bodyPr rtlCol="0" anchor="ctr"/>
+          <a:lstStyle/>
+          <a:p>
+            <a:pPr algn="ctr"/>
+            <a:r>
+              <a:rPr lang="en-US" sz="2800" dirty="0" smtClean="0"/>
+              <a:t>n</a:t>
+            </a:r>
+            <a:endParaRPr lang="en-US" sz="2800" dirty="0"/>
+          </a:p>
+        </p:txBody>
+      </p:sp>
+      <p:sp>
+        <p:nvSpPr>
+          <p:cNvPr id="46" name="Rectangle 45"/>
+          <p:cNvSpPr/>
+          <p:nvPr/>
+        </p:nvSpPr>
+        <p:spPr>
+          <a:xfrm>
+            <a:off x="6642100" y="5308600"/>
+            <a:ext cx="1092200" cy="533400"/>
+          </a:xfrm>
+          <a:prstGeom prst="rect">
+            <a:avLst/>
+          </a:prstGeom>
+          <a:noFill/>
           <a:ln>
-            <a:solidFill>
-              <a:schemeClr val="tx1"/>
-            </a:solidFill>
-            <a:headEnd type="arrow"/>
-            <a:tailEnd type="none"/>
+            <a:noFill/>
           </a:ln>
+        </p:spPr>
+        <p:style>
+          <a:lnRef idx="1">
+            <a:schemeClr val="accent1"/>
+          </a:lnRef>
+          <a:fillRef idx="3">
+            <a:schemeClr val="accent1"/>
+          </a:fillRef>
+          <a:effectRef idx="2">
+            <a:schemeClr val="accent1"/>
+          </a:effectRef>
+          <a:fontRef idx="minor">
+            <a:schemeClr val="lt1"/>
+          </a:fontRef>
+        </p:style>
+        <p:txBody>
+          <a:bodyPr rtlCol="0" anchor="ctr"/>
+          <a:lstStyle/>
+          <a:p>
+            <a:pPr algn="ctr"/>
+            <a:r>
+              <a:rPr lang="en-US" sz="3200" dirty="0" smtClean="0">
+                <a:solidFill>
+                  <a:schemeClr val="tx1"/>
+                </a:solidFill>
+              </a:rPr>
+              <a:t>. . .</a:t>
+            </a:r>
+            <a:endParaRPr lang="en-US" sz="3200" dirty="0">
+              <a:solidFill>
+                <a:schemeClr val="tx1"/>
+              </a:solidFill>
+            </a:endParaRPr>
+          </a:p>
+        </p:txBody>
+      </p:sp>
+      <p:cxnSp>
+        <p:nvCxnSpPr>
+          <p:cNvPr id="47" name="Straight Connector 46"/>
+          <p:cNvCxnSpPr/>
+          <p:nvPr/>
+        </p:nvCxnSpPr>
+        <p:spPr>
+          <a:xfrm flipV="1">
+            <a:off x="5359400" y="4483100"/>
+            <a:ext cx="2717800" cy="12700"/>
+          </a:xfrm>
+          <a:prstGeom prst="line">
+            <a:avLst/>
+          </a:prstGeom>
+        </p:spPr>
+        <p:style>
+          <a:lnRef idx="2">
+            <a:schemeClr val="accent1"/>
+          </a:lnRef>
+          <a:fillRef idx="0">
+            <a:schemeClr val="accent1"/>
+          </a:fillRef>
+          <a:effectRef idx="1">
+            <a:schemeClr val="accent1"/>
+          </a:effectRef>
+          <a:fontRef idx="minor">
+            <a:schemeClr val="tx1"/>
+          </a:fontRef>
+        </p:style>
+      </p:cxnSp>
+      <p:cxnSp>
+        <p:nvCxnSpPr>
+          <p:cNvPr id="48" name="Straight Connector 47"/>
+          <p:cNvCxnSpPr/>
+          <p:nvPr/>
+        </p:nvCxnSpPr>
+        <p:spPr>
+          <a:xfrm flipH="1">
+            <a:off x="6280150" y="3733800"/>
+            <a:ext cx="6350" cy="762000"/>
+          </a:xfrm>
+          <a:prstGeom prst="line">
+            <a:avLst/>
+          </a:prstGeom>
         </p:spPr>
         <p:style>
           <a:lnRef idx="2">
@@ -4762,7 +5804,7 @@
     </p:spTree>
     <p:extLst>
       <p:ext uri="{BB962C8B-B14F-4D97-AF65-F5344CB8AC3E}">
-        <p14:creationId xmlns:p14="http://schemas.microsoft.com/office/powerpoint/2010/main" val="1613062859"/>
+        <p14:creationId xmlns:p14="http://schemas.microsoft.com/office/powerpoint/2010/main" val="2343615104"/>
       </p:ext>
     </p:extLst>
   </p:cSld>

</xml_diff>